<commit_message>
Param for min samp len | Fix plots
</commit_message>
<xml_diff>
--- a/analysis/figures/2022_10_25_decoding_d_prime.pptx
+++ b/analysis/figures/2022_10_25_decoding_d_prime.pptx
@@ -37,6 +37,8 @@
     <p:sldId id="293" r:id="rId31"/>
     <p:sldId id="294" r:id="rId32"/>
     <p:sldId id="295" r:id="rId33"/>
+    <p:sldId id="298" r:id="rId34"/>
+    <p:sldId id="299" r:id="rId35"/>
   </p:sldIdLst>
   <p:sldSz cx="6858000" cy="10799763"/>
   <p:notesSz cx="6858000" cy="9144000"/>
@@ -274,7 +276,7 @@
           <a:p>
             <a:fld id="{1FFD9451-758E-4F4B-8EC8-A223DDE6F6D8}" type="datetimeFigureOut">
               <a:rPr lang="he-IL" smtClean="0"/>
-              <a:t>ה'/חשון/תשפ"ג</a:t>
+              <a:t>ל'/חשון/תשפ"ג</a:t>
             </a:fld>
             <a:endParaRPr lang="he-IL"/>
           </a:p>
@@ -444,7 +446,7 @@
           <a:p>
             <a:fld id="{1FFD9451-758E-4F4B-8EC8-A223DDE6F6D8}" type="datetimeFigureOut">
               <a:rPr lang="he-IL" smtClean="0"/>
-              <a:t>ה'/חשון/תשפ"ג</a:t>
+              <a:t>ל'/חשון/תשפ"ג</a:t>
             </a:fld>
             <a:endParaRPr lang="he-IL"/>
           </a:p>
@@ -624,7 +626,7 @@
           <a:p>
             <a:fld id="{1FFD9451-758E-4F4B-8EC8-A223DDE6F6D8}" type="datetimeFigureOut">
               <a:rPr lang="he-IL" smtClean="0"/>
-              <a:t>ה'/חשון/תשפ"ג</a:t>
+              <a:t>ל'/חשון/תשפ"ג</a:t>
             </a:fld>
             <a:endParaRPr lang="he-IL"/>
           </a:p>
@@ -794,7 +796,7 @@
           <a:p>
             <a:fld id="{1FFD9451-758E-4F4B-8EC8-A223DDE6F6D8}" type="datetimeFigureOut">
               <a:rPr lang="he-IL" smtClean="0"/>
-              <a:t>ה'/חשון/תשפ"ג</a:t>
+              <a:t>ל'/חשון/תשפ"ג</a:t>
             </a:fld>
             <a:endParaRPr lang="he-IL"/>
           </a:p>
@@ -1038,7 +1040,7 @@
           <a:p>
             <a:fld id="{1FFD9451-758E-4F4B-8EC8-A223DDE6F6D8}" type="datetimeFigureOut">
               <a:rPr lang="he-IL" smtClean="0"/>
-              <a:t>ה'/חשון/תשפ"ג</a:t>
+              <a:t>ל'/חשון/תשפ"ג</a:t>
             </a:fld>
             <a:endParaRPr lang="he-IL"/>
           </a:p>
@@ -1270,7 +1272,7 @@
           <a:p>
             <a:fld id="{1FFD9451-758E-4F4B-8EC8-A223DDE6F6D8}" type="datetimeFigureOut">
               <a:rPr lang="he-IL" smtClean="0"/>
-              <a:t>ה'/חשון/תשפ"ג</a:t>
+              <a:t>ל'/חשון/תשפ"ג</a:t>
             </a:fld>
             <a:endParaRPr lang="he-IL"/>
           </a:p>
@@ -1637,7 +1639,7 @@
           <a:p>
             <a:fld id="{1FFD9451-758E-4F4B-8EC8-A223DDE6F6D8}" type="datetimeFigureOut">
               <a:rPr lang="he-IL" smtClean="0"/>
-              <a:t>ה'/חשון/תשפ"ג</a:t>
+              <a:t>ל'/חשון/תשפ"ג</a:t>
             </a:fld>
             <a:endParaRPr lang="he-IL"/>
           </a:p>
@@ -1755,7 +1757,7 @@
           <a:p>
             <a:fld id="{1FFD9451-758E-4F4B-8EC8-A223DDE6F6D8}" type="datetimeFigureOut">
               <a:rPr lang="he-IL" smtClean="0"/>
-              <a:t>ה'/חשון/תשפ"ג</a:t>
+              <a:t>ל'/חשון/תשפ"ג</a:t>
             </a:fld>
             <a:endParaRPr lang="he-IL"/>
           </a:p>
@@ -1850,7 +1852,7 @@
           <a:p>
             <a:fld id="{1FFD9451-758E-4F4B-8EC8-A223DDE6F6D8}" type="datetimeFigureOut">
               <a:rPr lang="he-IL" smtClean="0"/>
-              <a:t>ה'/חשון/תשפ"ג</a:t>
+              <a:t>ל'/חשון/תשפ"ג</a:t>
             </a:fld>
             <a:endParaRPr lang="he-IL"/>
           </a:p>
@@ -2127,7 +2129,7 @@
           <a:p>
             <a:fld id="{1FFD9451-758E-4F4B-8EC8-A223DDE6F6D8}" type="datetimeFigureOut">
               <a:rPr lang="he-IL" smtClean="0"/>
-              <a:t>ה'/חשון/תשפ"ג</a:t>
+              <a:t>ל'/חשון/תשפ"ג</a:t>
             </a:fld>
             <a:endParaRPr lang="he-IL"/>
           </a:p>
@@ -2384,7 +2386,7 @@
           <a:p>
             <a:fld id="{1FFD9451-758E-4F4B-8EC8-A223DDE6F6D8}" type="datetimeFigureOut">
               <a:rPr lang="he-IL" smtClean="0"/>
-              <a:t>ה'/חשון/תשפ"ג</a:t>
+              <a:t>ל'/חשון/תשפ"ג</a:t>
             </a:fld>
             <a:endParaRPr lang="he-IL"/>
           </a:p>
@@ -2597,7 +2599,7 @@
           <a:p>
             <a:fld id="{1FFD9451-758E-4F4B-8EC8-A223DDE6F6D8}" type="datetimeFigureOut">
               <a:rPr lang="he-IL" smtClean="0"/>
-              <a:t>ה'/חשון/תשפ"ג</a:t>
+              <a:t>ל'/חשון/תשפ"ג</a:t>
             </a:fld>
             <a:endParaRPr lang="he-IL"/>
           </a:p>
@@ -11756,6 +11758,304 @@
 </p:sld>
 </file>
 
+<file path=ppt/slides/slide33.xml><?xml version="1.0" encoding="utf-8"?>
+<p:sld xmlns:a="http://schemas.openxmlformats.org/drawingml/2006/main" xmlns:r="http://schemas.openxmlformats.org/officeDocument/2006/relationships" xmlns:p="http://schemas.openxmlformats.org/presentationml/2006/main">
+  <p:cSld>
+    <p:spTree>
+      <p:nvGrpSpPr>
+        <p:cNvPr id="1" name=""/>
+        <p:cNvGrpSpPr/>
+        <p:nvPr/>
+      </p:nvGrpSpPr>
+      <p:grpSpPr>
+        <a:xfrm>
+          <a:off x="0" y="0"/>
+          <a:ext cx="0" cy="0"/>
+          <a:chOff x="0" y="0"/>
+          <a:chExt cx="0" cy="0"/>
+        </a:xfrm>
+      </p:grpSpPr>
+      <p:sp>
+        <p:nvSpPr>
+          <p:cNvPr id="13" name="TextBox 12">
+            <a:extLst>
+              <a:ext uri="{FF2B5EF4-FFF2-40B4-BE49-F238E27FC236}">
+                <a16:creationId xmlns:a16="http://schemas.microsoft.com/office/drawing/2014/main" id="{9115AC07-D4F6-68CC-65EC-11E0CFCBD19A}"/>
+              </a:ext>
+            </a:extLst>
+          </p:cNvPr>
+          <p:cNvSpPr txBox="1"/>
+          <p:nvPr/>
+        </p:nvSpPr>
+        <p:spPr>
+          <a:xfrm>
+            <a:off x="-45075" y="-75360"/>
+            <a:ext cx="6789572" cy="2062103"/>
+          </a:xfrm>
+          <a:prstGeom prst="rect">
+            <a:avLst/>
+          </a:prstGeom>
+          <a:noFill/>
+        </p:spPr>
+        <p:txBody>
+          <a:bodyPr wrap="square" rtlCol="1">
+            <a:spAutoFit/>
+          </a:bodyPr>
+          <a:lstStyle/>
+          <a:p>
+            <a:pPr algn="ctr"/>
+            <a:r>
+              <a:rPr lang="en-US" sz="3200" u="sng" dirty="0"/>
+              <a:t>In the next slides,</a:t>
+            </a:r>
+          </a:p>
+          <a:p>
+            <a:pPr algn="ctr"/>
+            <a:r>
+              <a:rPr lang="en-US" sz="3200" u="sng" dirty="0"/>
+              <a:t>I used Naïve Bayes, and I normalized the variables (features) within each subject before decoding</a:t>
+            </a:r>
+            <a:endParaRPr lang="he-IL" sz="3200" u="sng" dirty="0"/>
+          </a:p>
+        </p:txBody>
+      </p:sp>
+    </p:spTree>
+    <p:extLst>
+      <p:ext uri="{BB962C8B-B14F-4D97-AF65-F5344CB8AC3E}">
+        <p14:creationId xmlns:p14="http://schemas.microsoft.com/office/powerpoint/2010/main" val="1275223883"/>
+      </p:ext>
+    </p:extLst>
+  </p:cSld>
+  <p:clrMapOvr>
+    <a:masterClrMapping/>
+  </p:clrMapOvr>
+</p:sld>
+</file>
+
+<file path=ppt/slides/slide34.xml><?xml version="1.0" encoding="utf-8"?>
+<p:sld xmlns:a="http://schemas.openxmlformats.org/drawingml/2006/main" xmlns:r="http://schemas.openxmlformats.org/officeDocument/2006/relationships" xmlns:p="http://schemas.openxmlformats.org/presentationml/2006/main">
+  <p:cSld>
+    <p:spTree>
+      <p:nvGrpSpPr>
+        <p:cNvPr id="1" name=""/>
+        <p:cNvGrpSpPr/>
+        <p:nvPr/>
+      </p:nvGrpSpPr>
+      <p:grpSpPr>
+        <a:xfrm>
+          <a:off x="0" y="0"/>
+          <a:ext cx="0" cy="0"/>
+          <a:chOff x="0" y="0"/>
+          <a:chExt cx="0" cy="0"/>
+        </a:xfrm>
+      </p:grpSpPr>
+      <p:sp>
+        <p:nvSpPr>
+          <p:cNvPr id="6" name="TextBox 5">
+            <a:extLst>
+              <a:ext uri="{FF2B5EF4-FFF2-40B4-BE49-F238E27FC236}">
+                <a16:creationId xmlns:a16="http://schemas.microsoft.com/office/drawing/2014/main" id="{C2BBD00D-88DF-3C6D-2867-98F1C34075D3}"/>
+              </a:ext>
+            </a:extLst>
+          </p:cNvPr>
+          <p:cNvSpPr txBox="1"/>
+          <p:nvPr/>
+        </p:nvSpPr>
+        <p:spPr>
+          <a:xfrm>
+            <a:off x="-157767" y="-75360"/>
+            <a:ext cx="7175940" cy="1323439"/>
+          </a:xfrm>
+          <a:prstGeom prst="rect">
+            <a:avLst/>
+          </a:prstGeom>
+          <a:noFill/>
+        </p:spPr>
+        <p:txBody>
+          <a:bodyPr wrap="square" rtlCol="1">
+            <a:spAutoFit/>
+          </a:bodyPr>
+          <a:lstStyle/>
+          <a:p>
+            <a:pPr algn="ctr"/>
+            <a:r>
+              <a:rPr lang="en-US" sz="3200" u="sng" dirty="0">
+                <a:solidFill>
+                  <a:srgbClr val="FF0000"/>
+                </a:solidFill>
+              </a:rPr>
+              <a:t>Naïve Bayes </a:t>
+            </a:r>
+            <a:r>
+              <a:rPr lang="en-US" sz="3200" u="sng" dirty="0"/>
+              <a:t>Classifier with </a:t>
+            </a:r>
+            <a:r>
+              <a:rPr lang="en-US" sz="3200" u="sng" dirty="0" err="1"/>
+              <a:t>train+test</a:t>
+            </a:r>
+            <a:r>
+              <a:rPr lang="en-US" sz="3200" u="sng" dirty="0"/>
+              <a:t> split</a:t>
+            </a:r>
+          </a:p>
+          <a:p>
+            <a:pPr algn="ctr"/>
+            <a:r>
+              <a:rPr lang="en-US" sz="2400" dirty="0"/>
+              <a:t>Predictors: </a:t>
+            </a:r>
+            <a:r>
+              <a:rPr lang="nl-NL" sz="2400" i="0" dirty="0">
+                <a:effectLst/>
+                <a:latin typeface="Menlo"/>
+              </a:rPr>
+              <a:t>rt, react, mt, mad, tot_dist, auc</a:t>
+            </a:r>
+          </a:p>
+          <a:p>
+            <a:pPr algn="ctr"/>
+            <a:endParaRPr lang="he-IL" sz="2400" u="sng" dirty="0"/>
+          </a:p>
+        </p:txBody>
+      </p:sp>
+      <p:sp>
+        <p:nvSpPr>
+          <p:cNvPr id="8" name="TextBox 7">
+            <a:extLst>
+              <a:ext uri="{FF2B5EF4-FFF2-40B4-BE49-F238E27FC236}">
+                <a16:creationId xmlns:a16="http://schemas.microsoft.com/office/drawing/2014/main" id="{7378B937-BA87-15AF-FD1C-E5131B29AB34}"/>
+              </a:ext>
+            </a:extLst>
+          </p:cNvPr>
+          <p:cNvSpPr txBox="1"/>
+          <p:nvPr/>
+        </p:nvSpPr>
+        <p:spPr>
+          <a:xfrm>
+            <a:off x="-157767" y="5309815"/>
+            <a:ext cx="7173533" cy="954107"/>
+          </a:xfrm>
+          <a:prstGeom prst="rect">
+            <a:avLst/>
+          </a:prstGeom>
+          <a:noFill/>
+        </p:spPr>
+        <p:txBody>
+          <a:bodyPr wrap="square" rtlCol="1">
+            <a:spAutoFit/>
+          </a:bodyPr>
+          <a:lstStyle/>
+          <a:p>
+            <a:pPr algn="ctr"/>
+            <a:r>
+              <a:rPr lang="en-US" sz="3200" u="sng" dirty="0">
+                <a:solidFill>
+                  <a:srgbClr val="FF0000"/>
+                </a:solidFill>
+              </a:rPr>
+              <a:t>Naïve Bayes </a:t>
+            </a:r>
+            <a:r>
+              <a:rPr lang="en-US" sz="3200" u="sng" dirty="0"/>
+              <a:t>Classifier with </a:t>
+            </a:r>
+            <a:r>
+              <a:rPr lang="en-US" sz="3200" u="sng" dirty="0" err="1"/>
+              <a:t>train+test</a:t>
+            </a:r>
+            <a:r>
+              <a:rPr lang="en-US" sz="3200" u="sng" dirty="0"/>
+              <a:t> split</a:t>
+            </a:r>
+          </a:p>
+          <a:p>
+            <a:pPr algn="ctr"/>
+            <a:r>
+              <a:rPr lang="en-US" sz="2400" dirty="0"/>
+              <a:t>Predictors: </a:t>
+            </a:r>
+            <a:r>
+              <a:rPr lang="nl-NL" sz="2400" i="0" dirty="0">
+                <a:effectLst/>
+                <a:latin typeface="Menlo"/>
+              </a:rPr>
+              <a:t>30 traj samples</a:t>
+            </a:r>
+          </a:p>
+        </p:txBody>
+      </p:sp>
+      <p:pic>
+        <p:nvPicPr>
+          <p:cNvPr id="2" name="Picture 1">
+            <a:extLst>
+              <a:ext uri="{FF2B5EF4-FFF2-40B4-BE49-F238E27FC236}">
+                <a16:creationId xmlns:a16="http://schemas.microsoft.com/office/drawing/2014/main" id="{A352673D-404D-BE75-D324-64059685FE9D}"/>
+              </a:ext>
+            </a:extLst>
+          </p:cNvPr>
+          <p:cNvPicPr>
+            <a:picLocks noChangeAspect="1"/>
+          </p:cNvPicPr>
+          <p:nvPr/>
+        </p:nvPicPr>
+        <p:blipFill rotWithShape="1">
+          <a:blip r:embed="rId2"/>
+          <a:srcRect l="9491" t="3617" r="64846" b="50000"/>
+          <a:stretch/>
+        </p:blipFill>
+        <p:spPr>
+          <a:xfrm>
+            <a:off x="954688" y="829471"/>
+            <a:ext cx="4790045" cy="4373735"/>
+          </a:xfrm>
+          <a:prstGeom prst="rect">
+            <a:avLst/>
+          </a:prstGeom>
+        </p:spPr>
+      </p:pic>
+      <p:pic>
+        <p:nvPicPr>
+          <p:cNvPr id="10" name="Picture 9">
+            <a:extLst>
+              <a:ext uri="{FF2B5EF4-FFF2-40B4-BE49-F238E27FC236}">
+                <a16:creationId xmlns:a16="http://schemas.microsoft.com/office/drawing/2014/main" id="{6FA737E4-77B1-9D2B-AEEE-A4F25C9BA06C}"/>
+              </a:ext>
+            </a:extLst>
+          </p:cNvPr>
+          <p:cNvPicPr>
+            <a:picLocks noChangeAspect="1"/>
+          </p:cNvPicPr>
+          <p:nvPr/>
+        </p:nvPicPr>
+        <p:blipFill rotWithShape="1">
+          <a:blip r:embed="rId3"/>
+          <a:srcRect l="9014" t="4732" r="63662" b="50000"/>
+          <a:stretch/>
+        </p:blipFill>
+        <p:spPr>
+          <a:xfrm>
+            <a:off x="954688" y="6454995"/>
+            <a:ext cx="5190942" cy="4344768"/>
+          </a:xfrm>
+          <a:prstGeom prst="rect">
+            <a:avLst/>
+          </a:prstGeom>
+        </p:spPr>
+      </p:pic>
+    </p:spTree>
+    <p:extLst>
+      <p:ext uri="{BB962C8B-B14F-4D97-AF65-F5344CB8AC3E}">
+        <p14:creationId xmlns:p14="http://schemas.microsoft.com/office/powerpoint/2010/main" val="3625896515"/>
+      </p:ext>
+    </p:extLst>
+  </p:cSld>
+  <p:clrMapOvr>
+    <a:masterClrMapping/>
+  </p:clrMapOvr>
+</p:sld>
+</file>
+
 <file path=ppt/slides/slide4.xml><?xml version="1.0" encoding="utf-8"?>
 <p:sld xmlns:a="http://schemas.openxmlformats.org/drawingml/2006/main" xmlns:r="http://schemas.openxmlformats.org/officeDocument/2006/relationships" xmlns:p="http://schemas.openxmlformats.org/presentationml/2006/main">
   <p:cSld>

</xml_diff>

<commit_message>
Update TreeBH doc, and d' decode doc
</commit_message>
<xml_diff>
--- a/analysis/figures/2022_10_25_decoding_d_prime.pptx
+++ b/analysis/figures/2022_10_25_decoding_d_prime.pptx
@@ -5,7 +5,7 @@
     <p:sldMasterId id="2147483672" r:id="rId1"/>
   </p:sldMasterIdLst>
   <p:sldIdLst>
-    <p:sldId id="256" r:id="rId2"/>
+    <p:sldId id="300" r:id="rId2"/>
     <p:sldId id="280" r:id="rId3"/>
     <p:sldId id="261" r:id="rId4"/>
     <p:sldId id="262" r:id="rId5"/>
@@ -276,7 +276,7 @@
           <a:p>
             <a:fld id="{1FFD9451-758E-4F4B-8EC8-A223DDE6F6D8}" type="datetimeFigureOut">
               <a:rPr lang="he-IL" smtClean="0"/>
-              <a:t>ל'/חשון/תשפ"ג</a:t>
+              <a:t>י"ז/טבת/תשפ"ג</a:t>
             </a:fld>
             <a:endParaRPr lang="he-IL"/>
           </a:p>
@@ -446,7 +446,7 @@
           <a:p>
             <a:fld id="{1FFD9451-758E-4F4B-8EC8-A223DDE6F6D8}" type="datetimeFigureOut">
               <a:rPr lang="he-IL" smtClean="0"/>
-              <a:t>ל'/חשון/תשפ"ג</a:t>
+              <a:t>י"ז/טבת/תשפ"ג</a:t>
             </a:fld>
             <a:endParaRPr lang="he-IL"/>
           </a:p>
@@ -626,7 +626,7 @@
           <a:p>
             <a:fld id="{1FFD9451-758E-4F4B-8EC8-A223DDE6F6D8}" type="datetimeFigureOut">
               <a:rPr lang="he-IL" smtClean="0"/>
-              <a:t>ל'/חשון/תשפ"ג</a:t>
+              <a:t>י"ז/טבת/תשפ"ג</a:t>
             </a:fld>
             <a:endParaRPr lang="he-IL"/>
           </a:p>
@@ -796,7 +796,7 @@
           <a:p>
             <a:fld id="{1FFD9451-758E-4F4B-8EC8-A223DDE6F6D8}" type="datetimeFigureOut">
               <a:rPr lang="he-IL" smtClean="0"/>
-              <a:t>ל'/חשון/תשפ"ג</a:t>
+              <a:t>י"ז/טבת/תשפ"ג</a:t>
             </a:fld>
             <a:endParaRPr lang="he-IL"/>
           </a:p>
@@ -1040,7 +1040,7 @@
           <a:p>
             <a:fld id="{1FFD9451-758E-4F4B-8EC8-A223DDE6F6D8}" type="datetimeFigureOut">
               <a:rPr lang="he-IL" smtClean="0"/>
-              <a:t>ל'/חשון/תשפ"ג</a:t>
+              <a:t>י"ז/טבת/תשפ"ג</a:t>
             </a:fld>
             <a:endParaRPr lang="he-IL"/>
           </a:p>
@@ -1272,7 +1272,7 @@
           <a:p>
             <a:fld id="{1FFD9451-758E-4F4B-8EC8-A223DDE6F6D8}" type="datetimeFigureOut">
               <a:rPr lang="he-IL" smtClean="0"/>
-              <a:t>ל'/חשון/תשפ"ג</a:t>
+              <a:t>י"ז/טבת/תשפ"ג</a:t>
             </a:fld>
             <a:endParaRPr lang="he-IL"/>
           </a:p>
@@ -1639,7 +1639,7 @@
           <a:p>
             <a:fld id="{1FFD9451-758E-4F4B-8EC8-A223DDE6F6D8}" type="datetimeFigureOut">
               <a:rPr lang="he-IL" smtClean="0"/>
-              <a:t>ל'/חשון/תשפ"ג</a:t>
+              <a:t>י"ז/טבת/תשפ"ג</a:t>
             </a:fld>
             <a:endParaRPr lang="he-IL"/>
           </a:p>
@@ -1757,7 +1757,7 @@
           <a:p>
             <a:fld id="{1FFD9451-758E-4F4B-8EC8-A223DDE6F6D8}" type="datetimeFigureOut">
               <a:rPr lang="he-IL" smtClean="0"/>
-              <a:t>ל'/חשון/תשפ"ג</a:t>
+              <a:t>י"ז/טבת/תשפ"ג</a:t>
             </a:fld>
             <a:endParaRPr lang="he-IL"/>
           </a:p>
@@ -1852,7 +1852,7 @@
           <a:p>
             <a:fld id="{1FFD9451-758E-4F4B-8EC8-A223DDE6F6D8}" type="datetimeFigureOut">
               <a:rPr lang="he-IL" smtClean="0"/>
-              <a:t>ל'/חשון/תשפ"ג</a:t>
+              <a:t>י"ז/טבת/תשפ"ג</a:t>
             </a:fld>
             <a:endParaRPr lang="he-IL"/>
           </a:p>
@@ -2129,7 +2129,7 @@
           <a:p>
             <a:fld id="{1FFD9451-758E-4F4B-8EC8-A223DDE6F6D8}" type="datetimeFigureOut">
               <a:rPr lang="he-IL" smtClean="0"/>
-              <a:t>ל'/חשון/תשפ"ג</a:t>
+              <a:t>י"ז/טבת/תשפ"ג</a:t>
             </a:fld>
             <a:endParaRPr lang="he-IL"/>
           </a:p>
@@ -2386,7 +2386,7 @@
           <a:p>
             <a:fld id="{1FFD9451-758E-4F4B-8EC8-A223DDE6F6D8}" type="datetimeFigureOut">
               <a:rPr lang="he-IL" smtClean="0"/>
-              <a:t>ל'/חשון/תשפ"ג</a:t>
+              <a:t>י"ז/טבת/תשפ"ג</a:t>
             </a:fld>
             <a:endParaRPr lang="he-IL"/>
           </a:p>
@@ -2599,7 +2599,7 @@
           <a:p>
             <a:fld id="{1FFD9451-758E-4F4B-8EC8-A223DDE6F6D8}" type="datetimeFigureOut">
               <a:rPr lang="he-IL" smtClean="0"/>
-              <a:t>ל'/חשון/תשפ"ג</a:t>
+              <a:t>י"ז/טבת/תשפ"ג</a:t>
             </a:fld>
             <a:endParaRPr lang="he-IL"/>
           </a:p>
@@ -3051,7 +3051,7 @@
     </p:spTree>
     <p:extLst>
       <p:ext uri="{BB962C8B-B14F-4D97-AF65-F5344CB8AC3E}">
-        <p14:creationId xmlns:p14="http://schemas.microsoft.com/office/powerpoint/2010/main" val="1767266051"/>
+        <p14:creationId xmlns:p14="http://schemas.microsoft.com/office/powerpoint/2010/main" val="1094937605"/>
       </p:ext>
     </p:extLst>
   </p:cSld>
@@ -9886,6 +9886,44 @@
           </a:prstGeom>
         </p:spPr>
       </p:pic>
+      <p:sp>
+        <p:nvSpPr>
+          <p:cNvPr id="2" name="TextBox 1">
+            <a:extLst>
+              <a:ext uri="{FF2B5EF4-FFF2-40B4-BE49-F238E27FC236}">
+                <a16:creationId xmlns:a16="http://schemas.microsoft.com/office/drawing/2014/main" id="{94E1D5A5-610A-7124-FAE0-97E39153B317}"/>
+              </a:ext>
+            </a:extLst>
+          </p:cNvPr>
+          <p:cNvSpPr txBox="1"/>
+          <p:nvPr/>
+        </p:nvSpPr>
+        <p:spPr>
+          <a:xfrm rot="16200000">
+            <a:off x="375706" y="8023537"/>
+            <a:ext cx="1171977" cy="369332"/>
+          </a:xfrm>
+          <a:prstGeom prst="rect">
+            <a:avLst/>
+          </a:prstGeom>
+          <a:solidFill>
+            <a:schemeClr val="bg1"/>
+          </a:solidFill>
+        </p:spPr>
+        <p:txBody>
+          <a:bodyPr wrap="square" rtlCol="1">
+            <a:spAutoFit/>
+          </a:bodyPr>
+          <a:lstStyle/>
+          <a:p>
+            <a:r>
+              <a:rPr lang="en-US" dirty="0"/>
+              <a:t>D prime</a:t>
+            </a:r>
+            <a:endParaRPr lang="he-IL" dirty="0"/>
+          </a:p>
+        </p:txBody>
+      </p:sp>
     </p:spTree>
     <p:extLst>
       <p:ext uri="{BB962C8B-B14F-4D97-AF65-F5344CB8AC3E}">

</xml_diff>